<commit_message>
Update Leistungsnachweis BigData Plane Crashes.pptx
Struktur ergänzt
</commit_message>
<xml_diff>
--- a/Historical Plane Crashes/Präsentation/Leistungsnachweis BigData Plane Crashes.pptx
+++ b/Historical Plane Crashes/Präsentation/Leistungsnachweis BigData Plane Crashes.pptx
@@ -9,6 +9,7 @@
     <p:sldId id="257" r:id="rId3"/>
     <p:sldId id="258" r:id="rId4"/>
     <p:sldId id="259" r:id="rId5"/>
+    <p:sldId id="260" r:id="rId6"/>
   </p:sldIdLst>
   <p:sldSz cx="12192000" cy="6858000"/>
   <p:notesSz cx="6858000" cy="9144000"/>
@@ -107,6 +108,11 @@
       </a:defRPr>
     </a:lvl9pPr>
   </p:defaultTextStyle>
+  <p:extLst>
+    <p:ext uri="{EFAFB233-063F-42B5-8137-9DF3F51BA10A}">
+      <p15:sldGuideLst xmlns:p15="http://schemas.microsoft.com/office/powerpoint/2012/main"/>
+    </p:ext>
+  </p:extLst>
 </p:presentation>
 </file>
 
@@ -259,7 +265,7 @@
           <a:p>
             <a:fld id="{FC02D947-5CD4-43C9-B9B7-5313FA6B4BFC}" type="datetimeFigureOut">
               <a:rPr lang="de-CH" smtClean="0"/>
-              <a:t>21.12.2018</a:t>
+              <a:t>25.12.2018</a:t>
             </a:fld>
             <a:endParaRPr lang="de-CH"/>
           </a:p>
@@ -459,7 +465,7 @@
           <a:p>
             <a:fld id="{FC02D947-5CD4-43C9-B9B7-5313FA6B4BFC}" type="datetimeFigureOut">
               <a:rPr lang="de-CH" smtClean="0"/>
-              <a:t>21.12.2018</a:t>
+              <a:t>25.12.2018</a:t>
             </a:fld>
             <a:endParaRPr lang="de-CH"/>
           </a:p>
@@ -669,7 +675,7 @@
           <a:p>
             <a:fld id="{FC02D947-5CD4-43C9-B9B7-5313FA6B4BFC}" type="datetimeFigureOut">
               <a:rPr lang="de-CH" smtClean="0"/>
-              <a:t>21.12.2018</a:t>
+              <a:t>25.12.2018</a:t>
             </a:fld>
             <a:endParaRPr lang="de-CH"/>
           </a:p>
@@ -869,7 +875,7 @@
           <a:p>
             <a:fld id="{FC02D947-5CD4-43C9-B9B7-5313FA6B4BFC}" type="datetimeFigureOut">
               <a:rPr lang="de-CH" smtClean="0"/>
-              <a:t>21.12.2018</a:t>
+              <a:t>25.12.2018</a:t>
             </a:fld>
             <a:endParaRPr lang="de-CH"/>
           </a:p>
@@ -1145,7 +1151,7 @@
           <a:p>
             <a:fld id="{FC02D947-5CD4-43C9-B9B7-5313FA6B4BFC}" type="datetimeFigureOut">
               <a:rPr lang="de-CH" smtClean="0"/>
-              <a:t>21.12.2018</a:t>
+              <a:t>25.12.2018</a:t>
             </a:fld>
             <a:endParaRPr lang="de-CH"/>
           </a:p>
@@ -1413,7 +1419,7 @@
           <a:p>
             <a:fld id="{FC02D947-5CD4-43C9-B9B7-5313FA6B4BFC}" type="datetimeFigureOut">
               <a:rPr lang="de-CH" smtClean="0"/>
-              <a:t>21.12.2018</a:t>
+              <a:t>25.12.2018</a:t>
             </a:fld>
             <a:endParaRPr lang="de-CH"/>
           </a:p>
@@ -1828,7 +1834,7 @@
           <a:p>
             <a:fld id="{FC02D947-5CD4-43C9-B9B7-5313FA6B4BFC}" type="datetimeFigureOut">
               <a:rPr lang="de-CH" smtClean="0"/>
-              <a:t>21.12.2018</a:t>
+              <a:t>25.12.2018</a:t>
             </a:fld>
             <a:endParaRPr lang="de-CH"/>
           </a:p>
@@ -1970,7 +1976,7 @@
           <a:p>
             <a:fld id="{FC02D947-5CD4-43C9-B9B7-5313FA6B4BFC}" type="datetimeFigureOut">
               <a:rPr lang="de-CH" smtClean="0"/>
-              <a:t>21.12.2018</a:t>
+              <a:t>25.12.2018</a:t>
             </a:fld>
             <a:endParaRPr lang="de-CH"/>
           </a:p>
@@ -2083,7 +2089,7 @@
           <a:p>
             <a:fld id="{FC02D947-5CD4-43C9-B9B7-5313FA6B4BFC}" type="datetimeFigureOut">
               <a:rPr lang="de-CH" smtClean="0"/>
-              <a:t>21.12.2018</a:t>
+              <a:t>25.12.2018</a:t>
             </a:fld>
             <a:endParaRPr lang="de-CH"/>
           </a:p>
@@ -2396,7 +2402,7 @@
           <a:p>
             <a:fld id="{FC02D947-5CD4-43C9-B9B7-5313FA6B4BFC}" type="datetimeFigureOut">
               <a:rPr lang="de-CH" smtClean="0"/>
-              <a:t>21.12.2018</a:t>
+              <a:t>25.12.2018</a:t>
             </a:fld>
             <a:endParaRPr lang="de-CH"/>
           </a:p>
@@ -2685,7 +2691,7 @@
           <a:p>
             <a:fld id="{FC02D947-5CD4-43C9-B9B7-5313FA6B4BFC}" type="datetimeFigureOut">
               <a:rPr lang="de-CH" smtClean="0"/>
-              <a:t>21.12.2018</a:t>
+              <a:t>25.12.2018</a:t>
             </a:fld>
             <a:endParaRPr lang="de-CH"/>
           </a:p>
@@ -2928,7 +2934,7 @@
           <a:p>
             <a:fld id="{FC02D947-5CD4-43C9-B9B7-5313FA6B4BFC}" type="datetimeFigureOut">
               <a:rPr lang="de-CH" smtClean="0"/>
-              <a:t>21.12.2018</a:t>
+              <a:t>25.12.2018</a:t>
             </a:fld>
             <a:endParaRPr lang="de-CH"/>
           </a:p>
@@ -3461,38 +3467,477 @@
           </a:p>
         </p:txBody>
       </p:sp>
-      <p:sp>
-        <p:nvSpPr>
-          <p:cNvPr id="3" name="Inhaltsplatzhalter 2">
-            <a:extLst>
-              <a:ext uri="{FF2B5EF4-FFF2-40B4-BE49-F238E27FC236}">
-                <a16:creationId xmlns:a16="http://schemas.microsoft.com/office/drawing/2014/main" id="{302E95DD-CF69-4775-B4BD-C145FFBA3832}"/>
-              </a:ext>
-            </a:extLst>
-          </p:cNvPr>
-          <p:cNvSpPr>
-            <a:spLocks noGrp="1"/>
-          </p:cNvSpPr>
+      <p:graphicFrame>
+        <p:nvGraphicFramePr>
+          <p:cNvPr id="5" name="Inhaltsplatzhalter 4">
+            <a:extLst>
+              <a:ext uri="{FF2B5EF4-FFF2-40B4-BE49-F238E27FC236}">
+                <a16:creationId xmlns:a16="http://schemas.microsoft.com/office/drawing/2014/main" id="{9A409823-136A-499D-8BF9-C5178D25920C}"/>
+              </a:ext>
+            </a:extLst>
+          </p:cNvPr>
+          <p:cNvGraphicFramePr>
+            <a:graphicFrameLocks noGrp="1"/>
+          </p:cNvGraphicFramePr>
           <p:nvPr>
             <p:ph idx="1"/>
-          </p:nvPr>
-        </p:nvSpPr>
-        <p:spPr/>
-        <p:txBody>
-          <a:bodyPr/>
-          <a:lstStyle/>
-          <a:p>
-            <a:r>
-              <a:rPr lang="de-CH" dirty="0" err="1"/>
-              <a:t>Kaggle</a:t>
-            </a:r>
-            <a:r>
-              <a:rPr lang="de-CH" dirty="0"/>
-              <a:t> Link: https://www.kaggle.com/nguyenhoc/plane-crash</a:t>
-            </a:r>
-          </a:p>
-        </p:txBody>
-      </p:sp>
+            <p:extLst>
+              <p:ext uri="{D42A27DB-BD31-4B8C-83A1-F6EECF244321}">
+                <p14:modId xmlns:p14="http://schemas.microsoft.com/office/powerpoint/2010/main" val="2792111089"/>
+              </p:ext>
+            </p:extLst>
+          </p:nvPr>
+        </p:nvGraphicFramePr>
+        <p:xfrm>
+          <a:off x="838200" y="1825625"/>
+          <a:ext cx="10515600" cy="4450080"/>
+        </p:xfrm>
+        <a:graphic>
+          <a:graphicData uri="http://schemas.openxmlformats.org/drawingml/2006/table">
+            <a:tbl>
+              <a:tblPr bandRow="1">
+                <a:tableStyleId>{3B4B98B0-60AC-42C2-AFA5-B58CD77FA1E5}</a:tableStyleId>
+              </a:tblPr>
+              <a:tblGrid>
+                <a:gridCol w="2136494">
+                  <a:extLst>
+                    <a:ext uri="{9D8B030D-6E8A-4147-A177-3AD203B41FA5}">
+                      <a16:colId xmlns:a16="http://schemas.microsoft.com/office/drawing/2014/main" val="3476360805"/>
+                    </a:ext>
+                  </a:extLst>
+                </a:gridCol>
+                <a:gridCol w="8379106">
+                  <a:extLst>
+                    <a:ext uri="{9D8B030D-6E8A-4147-A177-3AD203B41FA5}">
+                      <a16:colId xmlns:a16="http://schemas.microsoft.com/office/drawing/2014/main" val="237656762"/>
+                    </a:ext>
+                  </a:extLst>
+                </a:gridCol>
+              </a:tblGrid>
+              <a:tr h="370840">
+                <a:tc>
+                  <a:txBody>
+                    <a:bodyPr/>
+                    <a:lstStyle/>
+                    <a:p>
+                      <a:pPr algn="r"/>
+                      <a:r>
+                        <a:rPr lang="de-CH" dirty="0"/>
+                        <a:t>Date:</a:t>
+                      </a:r>
+                    </a:p>
+                  </a:txBody>
+                  <a:tcPr marL="19050" marR="19050" marT="19050" marB="19050" anchor="ctr"/>
+                </a:tc>
+                <a:tc>
+                  <a:txBody>
+                    <a:bodyPr/>
+                    <a:lstStyle/>
+                    <a:p>
+                      <a:pPr algn="ctr"/>
+                      <a:r>
+                        <a:rPr lang="en-US"/>
+                        <a:t> Date of accident,  in the format - January 01, 2001</a:t>
+                      </a:r>
+                    </a:p>
+                  </a:txBody>
+                  <a:tcPr marL="19050" marR="19050" marT="19050" marB="19050" anchor="ctr"/>
+                </a:tc>
+                <a:extLst>
+                  <a:ext uri="{0D108BD9-81ED-4DB2-BD59-A6C34878D82A}">
+                    <a16:rowId xmlns:a16="http://schemas.microsoft.com/office/drawing/2014/main" val="2848495909"/>
+                  </a:ext>
+                </a:extLst>
+              </a:tr>
+              <a:tr h="370840">
+                <a:tc>
+                  <a:txBody>
+                    <a:bodyPr/>
+                    <a:lstStyle/>
+                    <a:p>
+                      <a:pPr algn="r"/>
+                      <a:r>
+                        <a:rPr lang="de-CH"/>
+                        <a:t>Time:</a:t>
+                      </a:r>
+                    </a:p>
+                  </a:txBody>
+                  <a:tcPr marL="19050" marR="19050" marT="19050" marB="19050" anchor="ctr"/>
+                </a:tc>
+                <a:tc>
+                  <a:txBody>
+                    <a:bodyPr/>
+                    <a:lstStyle/>
+                    <a:p>
+                      <a:pPr algn="ctr"/>
+                      <a:r>
+                        <a:rPr lang="en-US" dirty="0"/>
+                        <a:t> Local time, in 24 hr. format unless otherwise specified</a:t>
+                      </a:r>
+                    </a:p>
+                  </a:txBody>
+                  <a:tcPr marL="19050" marR="19050" marT="19050" marB="19050" anchor="ctr"/>
+                </a:tc>
+                <a:extLst>
+                  <a:ext uri="{0D108BD9-81ED-4DB2-BD59-A6C34878D82A}">
+                    <a16:rowId xmlns:a16="http://schemas.microsoft.com/office/drawing/2014/main" val="2282736117"/>
+                  </a:ext>
+                </a:extLst>
+              </a:tr>
+              <a:tr h="370840">
+                <a:tc>
+                  <a:txBody>
+                    <a:bodyPr/>
+                    <a:lstStyle/>
+                    <a:p>
+                      <a:pPr algn="r"/>
+                      <a:r>
+                        <a:rPr lang="de-CH"/>
+                        <a:t>Airline/Op:</a:t>
+                      </a:r>
+                    </a:p>
+                  </a:txBody>
+                  <a:tcPr marL="19050" marR="19050" marT="19050" marB="19050" anchor="ctr"/>
+                </a:tc>
+                <a:tc>
+                  <a:txBody>
+                    <a:bodyPr/>
+                    <a:lstStyle/>
+                    <a:p>
+                      <a:pPr algn="ctr"/>
+                      <a:r>
+                        <a:rPr lang="en-US"/>
+                        <a:t> Airline or operator of the aircraft</a:t>
+                      </a:r>
+                    </a:p>
+                  </a:txBody>
+                  <a:tcPr marL="19050" marR="19050" marT="19050" marB="19050" anchor="ctr"/>
+                </a:tc>
+                <a:extLst>
+                  <a:ext uri="{0D108BD9-81ED-4DB2-BD59-A6C34878D82A}">
+                    <a16:rowId xmlns:a16="http://schemas.microsoft.com/office/drawing/2014/main" val="4174940326"/>
+                  </a:ext>
+                </a:extLst>
+              </a:tr>
+              <a:tr h="370840">
+                <a:tc>
+                  <a:txBody>
+                    <a:bodyPr/>
+                    <a:lstStyle/>
+                    <a:p>
+                      <a:pPr algn="r"/>
+                      <a:r>
+                        <a:rPr lang="de-CH"/>
+                        <a:t>Flight #:</a:t>
+                      </a:r>
+                    </a:p>
+                  </a:txBody>
+                  <a:tcPr marL="19050" marR="19050" marT="19050" marB="19050" anchor="ctr"/>
+                </a:tc>
+                <a:tc>
+                  <a:txBody>
+                    <a:bodyPr/>
+                    <a:lstStyle/>
+                    <a:p>
+                      <a:pPr algn="ctr"/>
+                      <a:r>
+                        <a:rPr lang="en-US" dirty="0"/>
+                        <a:t> Flight number assigned by the aircraft operator</a:t>
+                      </a:r>
+                    </a:p>
+                  </a:txBody>
+                  <a:tcPr marL="19050" marR="19050" marT="19050" marB="19050" anchor="ctr"/>
+                </a:tc>
+                <a:extLst>
+                  <a:ext uri="{0D108BD9-81ED-4DB2-BD59-A6C34878D82A}">
+                    <a16:rowId xmlns:a16="http://schemas.microsoft.com/office/drawing/2014/main" val="3320050424"/>
+                  </a:ext>
+                </a:extLst>
+              </a:tr>
+              <a:tr h="370840">
+                <a:tc>
+                  <a:txBody>
+                    <a:bodyPr/>
+                    <a:lstStyle/>
+                    <a:p>
+                      <a:pPr algn="r"/>
+                      <a:r>
+                        <a:rPr lang="de-CH"/>
+                        <a:t>Route:</a:t>
+                      </a:r>
+                    </a:p>
+                  </a:txBody>
+                  <a:tcPr marL="19050" marR="19050" marT="19050" marB="19050" anchor="ctr"/>
+                </a:tc>
+                <a:tc>
+                  <a:txBody>
+                    <a:bodyPr/>
+                    <a:lstStyle/>
+                    <a:p>
+                      <a:pPr algn="ctr"/>
+                      <a:r>
+                        <a:rPr lang="en-US"/>
+                        <a:t> Complete or partial route flown prior to the accident</a:t>
+                      </a:r>
+                    </a:p>
+                  </a:txBody>
+                  <a:tcPr marL="19050" marR="19050" marT="19050" marB="19050" anchor="ctr"/>
+                </a:tc>
+                <a:extLst>
+                  <a:ext uri="{0D108BD9-81ED-4DB2-BD59-A6C34878D82A}">
+                    <a16:rowId xmlns:a16="http://schemas.microsoft.com/office/drawing/2014/main" val="596302097"/>
+                  </a:ext>
+                </a:extLst>
+              </a:tr>
+              <a:tr h="370840">
+                <a:tc>
+                  <a:txBody>
+                    <a:bodyPr/>
+                    <a:lstStyle/>
+                    <a:p>
+                      <a:pPr algn="r"/>
+                      <a:r>
+                        <a:rPr lang="de-CH"/>
+                        <a:t>AC Type:</a:t>
+                      </a:r>
+                    </a:p>
+                  </a:txBody>
+                  <a:tcPr marL="19050" marR="19050" marT="19050" marB="19050" anchor="ctr"/>
+                </a:tc>
+                <a:tc>
+                  <a:txBody>
+                    <a:bodyPr/>
+                    <a:lstStyle/>
+                    <a:p>
+                      <a:pPr algn="ctr"/>
+                      <a:r>
+                        <a:rPr lang="de-CH"/>
+                        <a:t> Aircraft type</a:t>
+                      </a:r>
+                    </a:p>
+                  </a:txBody>
+                  <a:tcPr marL="19050" marR="19050" marT="19050" marB="19050" anchor="ctr"/>
+                </a:tc>
+                <a:extLst>
+                  <a:ext uri="{0D108BD9-81ED-4DB2-BD59-A6C34878D82A}">
+                    <a16:rowId xmlns:a16="http://schemas.microsoft.com/office/drawing/2014/main" val="2050646390"/>
+                  </a:ext>
+                </a:extLst>
+              </a:tr>
+              <a:tr h="370840">
+                <a:tc>
+                  <a:txBody>
+                    <a:bodyPr/>
+                    <a:lstStyle/>
+                    <a:p>
+                      <a:pPr algn="r"/>
+                      <a:r>
+                        <a:rPr lang="de-CH"/>
+                        <a:t>Reg:</a:t>
+                      </a:r>
+                    </a:p>
+                  </a:txBody>
+                  <a:tcPr marL="19050" marR="19050" marT="19050" marB="19050" anchor="ctr"/>
+                </a:tc>
+                <a:tc>
+                  <a:txBody>
+                    <a:bodyPr/>
+                    <a:lstStyle/>
+                    <a:p>
+                      <a:pPr algn="ctr"/>
+                      <a:r>
+                        <a:rPr lang="en-US"/>
+                        <a:t> ICAO registration of the aircraft</a:t>
+                      </a:r>
+                    </a:p>
+                  </a:txBody>
+                  <a:tcPr marL="19050" marR="19050" marT="19050" marB="19050" anchor="ctr"/>
+                </a:tc>
+                <a:extLst>
+                  <a:ext uri="{0D108BD9-81ED-4DB2-BD59-A6C34878D82A}">
+                    <a16:rowId xmlns:a16="http://schemas.microsoft.com/office/drawing/2014/main" val="917791331"/>
+                  </a:ext>
+                </a:extLst>
+              </a:tr>
+              <a:tr h="370840">
+                <a:tc>
+                  <a:txBody>
+                    <a:bodyPr/>
+                    <a:lstStyle/>
+                    <a:p>
+                      <a:pPr algn="r"/>
+                      <a:r>
+                        <a:rPr lang="de-CH"/>
+                        <a:t>cn / ln:</a:t>
+                      </a:r>
+                    </a:p>
+                  </a:txBody>
+                  <a:tcPr marL="19050" marR="19050" marT="19050" marB="19050" anchor="ctr"/>
+                </a:tc>
+                <a:tc>
+                  <a:txBody>
+                    <a:bodyPr/>
+                    <a:lstStyle/>
+                    <a:p>
+                      <a:pPr algn="ctr"/>
+                      <a:r>
+                        <a:rPr lang="en-US"/>
+                        <a:t> Construction or serial number / Line or fuselage number</a:t>
+                      </a:r>
+                    </a:p>
+                  </a:txBody>
+                  <a:tcPr marL="19050" marR="19050" marT="19050" marB="19050" anchor="ctr"/>
+                </a:tc>
+                <a:extLst>
+                  <a:ext uri="{0D108BD9-81ED-4DB2-BD59-A6C34878D82A}">
+                    <a16:rowId xmlns:a16="http://schemas.microsoft.com/office/drawing/2014/main" val="1169036111"/>
+                  </a:ext>
+                </a:extLst>
+              </a:tr>
+              <a:tr h="370840">
+                <a:tc>
+                  <a:txBody>
+                    <a:bodyPr/>
+                    <a:lstStyle/>
+                    <a:p>
+                      <a:pPr algn="r"/>
+                      <a:r>
+                        <a:rPr lang="de-CH"/>
+                        <a:t>Aboard:</a:t>
+                      </a:r>
+                    </a:p>
+                  </a:txBody>
+                  <a:tcPr marL="19050" marR="19050" marT="19050" marB="19050" anchor="ctr"/>
+                </a:tc>
+                <a:tc>
+                  <a:txBody>
+                    <a:bodyPr/>
+                    <a:lstStyle/>
+                    <a:p>
+                      <a:pPr algn="ctr"/>
+                      <a:r>
+                        <a:rPr lang="de-CH"/>
+                        <a:t> Total aboard (passengers / crew)</a:t>
+                      </a:r>
+                    </a:p>
+                  </a:txBody>
+                  <a:tcPr marL="19050" marR="19050" marT="19050" marB="19050" anchor="ctr"/>
+                </a:tc>
+                <a:extLst>
+                  <a:ext uri="{0D108BD9-81ED-4DB2-BD59-A6C34878D82A}">
+                    <a16:rowId xmlns:a16="http://schemas.microsoft.com/office/drawing/2014/main" val="1861299588"/>
+                  </a:ext>
+                </a:extLst>
+              </a:tr>
+              <a:tr h="370840">
+                <a:tc>
+                  <a:txBody>
+                    <a:bodyPr/>
+                    <a:lstStyle/>
+                    <a:p>
+                      <a:pPr algn="r"/>
+                      <a:r>
+                        <a:rPr lang="de-CH"/>
+                        <a:t>Fatalities:</a:t>
+                      </a:r>
+                    </a:p>
+                  </a:txBody>
+                  <a:tcPr marL="19050" marR="19050" marT="19050" marB="19050" anchor="ctr"/>
+                </a:tc>
+                <a:tc>
+                  <a:txBody>
+                    <a:bodyPr/>
+                    <a:lstStyle/>
+                    <a:p>
+                      <a:pPr algn="ctr"/>
+                      <a:r>
+                        <a:rPr lang="en-US"/>
+                        <a:t> Total fatalities aboard (passengers / crew)</a:t>
+                      </a:r>
+                    </a:p>
+                  </a:txBody>
+                  <a:tcPr marL="19050" marR="19050" marT="19050" marB="19050" anchor="ctr"/>
+                </a:tc>
+                <a:extLst>
+                  <a:ext uri="{0D108BD9-81ED-4DB2-BD59-A6C34878D82A}">
+                    <a16:rowId xmlns:a16="http://schemas.microsoft.com/office/drawing/2014/main" val="1880564660"/>
+                  </a:ext>
+                </a:extLst>
+              </a:tr>
+              <a:tr h="370840">
+                <a:tc>
+                  <a:txBody>
+                    <a:bodyPr/>
+                    <a:lstStyle/>
+                    <a:p>
+                      <a:pPr algn="r"/>
+                      <a:r>
+                        <a:rPr lang="de-CH"/>
+                        <a:t>Ground:</a:t>
+                      </a:r>
+                    </a:p>
+                  </a:txBody>
+                  <a:tcPr marL="19050" marR="19050" marT="19050" marB="19050" anchor="ctr"/>
+                </a:tc>
+                <a:tc>
+                  <a:txBody>
+                    <a:bodyPr/>
+                    <a:lstStyle/>
+                    <a:p>
+                      <a:pPr algn="ctr"/>
+                      <a:r>
+                        <a:rPr lang="en-US"/>
+                        <a:t> Total killed on the ground</a:t>
+                      </a:r>
+                    </a:p>
+                  </a:txBody>
+                  <a:tcPr marL="19050" marR="19050" marT="19050" marB="19050" anchor="ctr"/>
+                </a:tc>
+                <a:extLst>
+                  <a:ext uri="{0D108BD9-81ED-4DB2-BD59-A6C34878D82A}">
+                    <a16:rowId xmlns:a16="http://schemas.microsoft.com/office/drawing/2014/main" val="653894780"/>
+                  </a:ext>
+                </a:extLst>
+              </a:tr>
+              <a:tr h="370840">
+                <a:tc>
+                  <a:txBody>
+                    <a:bodyPr/>
+                    <a:lstStyle/>
+                    <a:p>
+                      <a:pPr algn="r"/>
+                      <a:r>
+                        <a:rPr lang="de-CH"/>
+                        <a:t>Summary:</a:t>
+                      </a:r>
+                    </a:p>
+                  </a:txBody>
+                  <a:tcPr marL="19050" marR="19050" marT="19050" marB="19050" anchor="ctr"/>
+                </a:tc>
+                <a:tc>
+                  <a:txBody>
+                    <a:bodyPr/>
+                    <a:lstStyle/>
+                    <a:p>
+                      <a:pPr algn="ctr"/>
+                      <a:r>
+                        <a:rPr lang="en-US" dirty="0"/>
+                        <a:t> Brief description of the accident and cause if known</a:t>
+                      </a:r>
+                    </a:p>
+                  </a:txBody>
+                  <a:tcPr marL="19050" marR="19050" marT="19050" marB="19050" anchor="ctr"/>
+                </a:tc>
+                <a:extLst>
+                  <a:ext uri="{0D108BD9-81ED-4DB2-BD59-A6C34878D82A}">
+                    <a16:rowId xmlns:a16="http://schemas.microsoft.com/office/drawing/2014/main" val="3191412109"/>
+                  </a:ext>
+                </a:extLst>
+              </a:tr>
+            </a:tbl>
+          </a:graphicData>
+        </a:graphic>
+      </p:graphicFrame>
     </p:spTree>
     <p:extLst>
       <p:ext uri="{BB962C8B-B14F-4D97-AF65-F5344CB8AC3E}">
@@ -4169,6 +4614,317 @@
     <p:extLst>
       <p:ext uri="{BB962C8B-B14F-4D97-AF65-F5344CB8AC3E}">
         <p14:creationId xmlns:p14="http://schemas.microsoft.com/office/powerpoint/2010/main" val="1617491078"/>
+      </p:ext>
+    </p:extLst>
+  </p:cSld>
+  <p:clrMapOvr>
+    <a:masterClrMapping/>
+  </p:clrMapOvr>
+</p:sld>
+</file>
+
+<file path=ppt/slides/slide5.xml><?xml version="1.0" encoding="utf-8"?>
+<p:sld xmlns:a="http://schemas.openxmlformats.org/drawingml/2006/main" xmlns:r="http://schemas.openxmlformats.org/officeDocument/2006/relationships" xmlns:p="http://schemas.openxmlformats.org/presentationml/2006/main">
+  <p:cSld>
+    <p:spTree>
+      <p:nvGrpSpPr>
+        <p:cNvPr id="1" name=""/>
+        <p:cNvGrpSpPr/>
+        <p:nvPr/>
+      </p:nvGrpSpPr>
+      <p:grpSpPr>
+        <a:xfrm>
+          <a:off x="0" y="0"/>
+          <a:ext cx="0" cy="0"/>
+          <a:chOff x="0" y="0"/>
+          <a:chExt cx="0" cy="0"/>
+        </a:xfrm>
+      </p:grpSpPr>
+      <p:sp>
+        <p:nvSpPr>
+          <p:cNvPr id="2" name="Titel 1">
+            <a:extLst>
+              <a:ext uri="{FF2B5EF4-FFF2-40B4-BE49-F238E27FC236}">
+                <a16:creationId xmlns:a16="http://schemas.microsoft.com/office/drawing/2014/main" id="{E9563C62-FCD4-4589-816C-E2F2CFDC30C3}"/>
+              </a:ext>
+            </a:extLst>
+          </p:cNvPr>
+          <p:cNvSpPr>
+            <a:spLocks noGrp="1"/>
+          </p:cNvSpPr>
+          <p:nvPr>
+            <p:ph type="title"/>
+          </p:nvPr>
+        </p:nvSpPr>
+        <p:spPr/>
+        <p:txBody>
+          <a:bodyPr/>
+          <a:lstStyle/>
+          <a:p>
+            <a:r>
+              <a:rPr lang="de-CH" dirty="0"/>
+              <a:t>Dataset – Quellen</a:t>
+            </a:r>
+          </a:p>
+        </p:txBody>
+      </p:sp>
+      <p:sp>
+        <p:nvSpPr>
+          <p:cNvPr id="3" name="Inhaltsplatzhalter 2">
+            <a:extLst>
+              <a:ext uri="{FF2B5EF4-FFF2-40B4-BE49-F238E27FC236}">
+                <a16:creationId xmlns:a16="http://schemas.microsoft.com/office/drawing/2014/main" id="{204E2B80-1A15-4623-8C9C-DC9024E7A4ED}"/>
+              </a:ext>
+            </a:extLst>
+          </p:cNvPr>
+          <p:cNvSpPr>
+            <a:spLocks noGrp="1"/>
+          </p:cNvSpPr>
+          <p:nvPr>
+            <p:ph idx="1"/>
+          </p:nvPr>
+        </p:nvSpPr>
+        <p:spPr/>
+        <p:txBody>
+          <a:bodyPr/>
+          <a:lstStyle/>
+          <a:p>
+            <a:pPr marL="0" indent="0">
+              <a:buNone/>
+            </a:pPr>
+            <a:endParaRPr lang="de-CH" dirty="0"/>
+          </a:p>
+          <a:p>
+            <a:endParaRPr lang="de-CH" dirty="0"/>
+          </a:p>
+        </p:txBody>
+      </p:sp>
+      <p:sp>
+        <p:nvSpPr>
+          <p:cNvPr id="5" name="Inhaltsplatzhalter 2">
+            <a:extLst>
+              <a:ext uri="{FF2B5EF4-FFF2-40B4-BE49-F238E27FC236}">
+                <a16:creationId xmlns:a16="http://schemas.microsoft.com/office/drawing/2014/main" id="{5C33C5D6-FF92-4756-90EC-6372FC19F00E}"/>
+              </a:ext>
+            </a:extLst>
+          </p:cNvPr>
+          <p:cNvSpPr txBox="1">
+            <a:spLocks/>
+          </p:cNvSpPr>
+          <p:nvPr/>
+        </p:nvSpPr>
+        <p:spPr>
+          <a:xfrm>
+            <a:off x="990600" y="1978025"/>
+            <a:ext cx="10515600" cy="4351338"/>
+          </a:xfrm>
+          <a:prstGeom prst="rect">
+            <a:avLst/>
+          </a:prstGeom>
+        </p:spPr>
+        <p:txBody>
+          <a:bodyPr vert="horz" lIns="91440" tIns="45720" rIns="91440" bIns="45720" rtlCol="0">
+            <a:normAutofit/>
+          </a:bodyPr>
+          <a:lstStyle>
+            <a:lvl1pPr marL="228600" indent="-228600" algn="l" defTabSz="914400" rtl="0" eaLnBrk="1" latinLnBrk="0" hangingPunct="1">
+              <a:lnSpc>
+                <a:spcPct val="90000"/>
+              </a:lnSpc>
+              <a:spcBef>
+                <a:spcPts val="1000"/>
+              </a:spcBef>
+              <a:buFont typeface="Arial" panose="020B0604020202020204" pitchFamily="34" charset="0"/>
+              <a:buChar char="•"/>
+              <a:defRPr sz="2800" kern="1200">
+                <a:solidFill>
+                  <a:schemeClr val="tx1"/>
+                </a:solidFill>
+                <a:latin typeface="+mn-lt"/>
+                <a:ea typeface="+mn-ea"/>
+                <a:cs typeface="+mn-cs"/>
+              </a:defRPr>
+            </a:lvl1pPr>
+            <a:lvl2pPr marL="685800" indent="-228600" algn="l" defTabSz="914400" rtl="0" eaLnBrk="1" latinLnBrk="0" hangingPunct="1">
+              <a:lnSpc>
+                <a:spcPct val="90000"/>
+              </a:lnSpc>
+              <a:spcBef>
+                <a:spcPts val="500"/>
+              </a:spcBef>
+              <a:buFont typeface="Arial" panose="020B0604020202020204" pitchFamily="34" charset="0"/>
+              <a:buChar char="•"/>
+              <a:defRPr sz="2400" kern="1200">
+                <a:solidFill>
+                  <a:schemeClr val="tx1"/>
+                </a:solidFill>
+                <a:latin typeface="+mn-lt"/>
+                <a:ea typeface="+mn-ea"/>
+                <a:cs typeface="+mn-cs"/>
+              </a:defRPr>
+            </a:lvl2pPr>
+            <a:lvl3pPr marL="1143000" indent="-228600" algn="l" defTabSz="914400" rtl="0" eaLnBrk="1" latinLnBrk="0" hangingPunct="1">
+              <a:lnSpc>
+                <a:spcPct val="90000"/>
+              </a:lnSpc>
+              <a:spcBef>
+                <a:spcPts val="500"/>
+              </a:spcBef>
+              <a:buFont typeface="Arial" panose="020B0604020202020204" pitchFamily="34" charset="0"/>
+              <a:buChar char="•"/>
+              <a:defRPr sz="2000" kern="1200">
+                <a:solidFill>
+                  <a:schemeClr val="tx1"/>
+                </a:solidFill>
+                <a:latin typeface="+mn-lt"/>
+                <a:ea typeface="+mn-ea"/>
+                <a:cs typeface="+mn-cs"/>
+              </a:defRPr>
+            </a:lvl3pPr>
+            <a:lvl4pPr marL="1600200" indent="-228600" algn="l" defTabSz="914400" rtl="0" eaLnBrk="1" latinLnBrk="0" hangingPunct="1">
+              <a:lnSpc>
+                <a:spcPct val="90000"/>
+              </a:lnSpc>
+              <a:spcBef>
+                <a:spcPts val="500"/>
+              </a:spcBef>
+              <a:buFont typeface="Arial" panose="020B0604020202020204" pitchFamily="34" charset="0"/>
+              <a:buChar char="•"/>
+              <a:defRPr sz="1800" kern="1200">
+                <a:solidFill>
+                  <a:schemeClr val="tx1"/>
+                </a:solidFill>
+                <a:latin typeface="+mn-lt"/>
+                <a:ea typeface="+mn-ea"/>
+                <a:cs typeface="+mn-cs"/>
+              </a:defRPr>
+            </a:lvl4pPr>
+            <a:lvl5pPr marL="2057400" indent="-228600" algn="l" defTabSz="914400" rtl="0" eaLnBrk="1" latinLnBrk="0" hangingPunct="1">
+              <a:lnSpc>
+                <a:spcPct val="90000"/>
+              </a:lnSpc>
+              <a:spcBef>
+                <a:spcPts val="500"/>
+              </a:spcBef>
+              <a:buFont typeface="Arial" panose="020B0604020202020204" pitchFamily="34" charset="0"/>
+              <a:buChar char="•"/>
+              <a:defRPr sz="1800" kern="1200">
+                <a:solidFill>
+                  <a:schemeClr val="tx1"/>
+                </a:solidFill>
+                <a:latin typeface="+mn-lt"/>
+                <a:ea typeface="+mn-ea"/>
+                <a:cs typeface="+mn-cs"/>
+              </a:defRPr>
+            </a:lvl5pPr>
+            <a:lvl6pPr marL="2514600" indent="-228600" algn="l" defTabSz="914400" rtl="0" eaLnBrk="1" latinLnBrk="0" hangingPunct="1">
+              <a:lnSpc>
+                <a:spcPct val="90000"/>
+              </a:lnSpc>
+              <a:spcBef>
+                <a:spcPts val="500"/>
+              </a:spcBef>
+              <a:buFont typeface="Arial" panose="020B0604020202020204" pitchFamily="34" charset="0"/>
+              <a:buChar char="•"/>
+              <a:defRPr sz="1800" kern="1200">
+                <a:solidFill>
+                  <a:schemeClr val="tx1"/>
+                </a:solidFill>
+                <a:latin typeface="+mn-lt"/>
+                <a:ea typeface="+mn-ea"/>
+                <a:cs typeface="+mn-cs"/>
+              </a:defRPr>
+            </a:lvl6pPr>
+            <a:lvl7pPr marL="2971800" indent="-228600" algn="l" defTabSz="914400" rtl="0" eaLnBrk="1" latinLnBrk="0" hangingPunct="1">
+              <a:lnSpc>
+                <a:spcPct val="90000"/>
+              </a:lnSpc>
+              <a:spcBef>
+                <a:spcPts val="500"/>
+              </a:spcBef>
+              <a:buFont typeface="Arial" panose="020B0604020202020204" pitchFamily="34" charset="0"/>
+              <a:buChar char="•"/>
+              <a:defRPr sz="1800" kern="1200">
+                <a:solidFill>
+                  <a:schemeClr val="tx1"/>
+                </a:solidFill>
+                <a:latin typeface="+mn-lt"/>
+                <a:ea typeface="+mn-ea"/>
+                <a:cs typeface="+mn-cs"/>
+              </a:defRPr>
+            </a:lvl7pPr>
+            <a:lvl8pPr marL="3429000" indent="-228600" algn="l" defTabSz="914400" rtl="0" eaLnBrk="1" latinLnBrk="0" hangingPunct="1">
+              <a:lnSpc>
+                <a:spcPct val="90000"/>
+              </a:lnSpc>
+              <a:spcBef>
+                <a:spcPts val="500"/>
+              </a:spcBef>
+              <a:buFont typeface="Arial" panose="020B0604020202020204" pitchFamily="34" charset="0"/>
+              <a:buChar char="•"/>
+              <a:defRPr sz="1800" kern="1200">
+                <a:solidFill>
+                  <a:schemeClr val="tx1"/>
+                </a:solidFill>
+                <a:latin typeface="+mn-lt"/>
+                <a:ea typeface="+mn-ea"/>
+                <a:cs typeface="+mn-cs"/>
+              </a:defRPr>
+            </a:lvl8pPr>
+            <a:lvl9pPr marL="3886200" indent="-228600" algn="l" defTabSz="914400" rtl="0" eaLnBrk="1" latinLnBrk="0" hangingPunct="1">
+              <a:lnSpc>
+                <a:spcPct val="90000"/>
+              </a:lnSpc>
+              <a:spcBef>
+                <a:spcPts val="500"/>
+              </a:spcBef>
+              <a:buFont typeface="Arial" panose="020B0604020202020204" pitchFamily="34" charset="0"/>
+              <a:buChar char="•"/>
+              <a:defRPr sz="1800" kern="1200">
+                <a:solidFill>
+                  <a:schemeClr val="tx1"/>
+                </a:solidFill>
+                <a:latin typeface="+mn-lt"/>
+                <a:ea typeface="+mn-ea"/>
+                <a:cs typeface="+mn-cs"/>
+              </a:defRPr>
+            </a:lvl9pPr>
+          </a:lstStyle>
+          <a:p>
+            <a:r>
+              <a:rPr lang="de-CH" dirty="0" err="1"/>
+              <a:t>Kaggle</a:t>
+            </a:r>
+            <a:r>
+              <a:rPr lang="de-CH" dirty="0"/>
+              <a:t> Link: </a:t>
+            </a:r>
+            <a:r>
+              <a:rPr lang="de-CH" dirty="0">
+                <a:hlinkClick r:id="rId2"/>
+              </a:rPr>
+              <a:t>https://www.kaggle.com/nguyenhoc/plane-crash</a:t>
+            </a:r>
+            <a:endParaRPr lang="de-CH" dirty="0"/>
+          </a:p>
+          <a:p>
+            <a:r>
+              <a:rPr lang="de-CH" dirty="0">
+                <a:hlinkClick r:id="rId3"/>
+              </a:rPr>
+              <a:t>http://www.planecrashinfo.com/</a:t>
+            </a:r>
+            <a:endParaRPr lang="de-CH" dirty="0"/>
+          </a:p>
+          <a:p>
+            <a:endParaRPr lang="de-CH" dirty="0"/>
+          </a:p>
+        </p:txBody>
+      </p:sp>
+    </p:spTree>
+    <p:extLst>
+      <p:ext uri="{BB962C8B-B14F-4D97-AF65-F5344CB8AC3E}">
+        <p14:creationId xmlns:p14="http://schemas.microsoft.com/office/powerpoint/2010/main" val="3938903324"/>
       </p:ext>
     </p:extLst>
   </p:cSld>

</xml_diff>

<commit_message>
add new notebook & adjust slides
</commit_message>
<xml_diff>
--- a/Historical Plane Crashes/Präsentation/Leistungsnachweis BigData Plane Crashes.pptx
+++ b/Historical Plane Crashes/Präsentation/Leistungsnachweis BigData Plane Crashes.pptx
@@ -9,7 +9,8 @@
     <p:sldId id="257" r:id="rId3"/>
     <p:sldId id="258" r:id="rId4"/>
     <p:sldId id="259" r:id="rId5"/>
-    <p:sldId id="260" r:id="rId6"/>
+    <p:sldId id="261" r:id="rId6"/>
+    <p:sldId id="260" r:id="rId7"/>
   </p:sldIdLst>
   <p:sldSz cx="12192000" cy="6858000"/>
   <p:notesSz cx="6858000" cy="9144000"/>
@@ -265,7 +266,7 @@
           <a:p>
             <a:fld id="{FC02D947-5CD4-43C9-B9B7-5313FA6B4BFC}" type="datetimeFigureOut">
               <a:rPr lang="de-CH" smtClean="0"/>
-              <a:t>25.12.2018</a:t>
+              <a:t>25.12.18</a:t>
             </a:fld>
             <a:endParaRPr lang="de-CH"/>
           </a:p>
@@ -319,7 +320,7 @@
           <a:p>
             <a:fld id="{15D51E6F-5B60-4FC6-BA9B-6FB531DBD218}" type="slidenum">
               <a:rPr lang="de-CH" smtClean="0"/>
-              <a:t>‹Nr.›</a:t>
+              <a:t>‹#›</a:t>
             </a:fld>
             <a:endParaRPr lang="de-CH"/>
           </a:p>
@@ -465,7 +466,7 @@
           <a:p>
             <a:fld id="{FC02D947-5CD4-43C9-B9B7-5313FA6B4BFC}" type="datetimeFigureOut">
               <a:rPr lang="de-CH" smtClean="0"/>
-              <a:t>25.12.2018</a:t>
+              <a:t>25.12.18</a:t>
             </a:fld>
             <a:endParaRPr lang="de-CH"/>
           </a:p>
@@ -519,7 +520,7 @@
           <a:p>
             <a:fld id="{15D51E6F-5B60-4FC6-BA9B-6FB531DBD218}" type="slidenum">
               <a:rPr lang="de-CH" smtClean="0"/>
-              <a:t>‹Nr.›</a:t>
+              <a:t>‹#›</a:t>
             </a:fld>
             <a:endParaRPr lang="de-CH"/>
           </a:p>
@@ -675,7 +676,7 @@
           <a:p>
             <a:fld id="{FC02D947-5CD4-43C9-B9B7-5313FA6B4BFC}" type="datetimeFigureOut">
               <a:rPr lang="de-CH" smtClean="0"/>
-              <a:t>25.12.2018</a:t>
+              <a:t>25.12.18</a:t>
             </a:fld>
             <a:endParaRPr lang="de-CH"/>
           </a:p>
@@ -729,7 +730,7 @@
           <a:p>
             <a:fld id="{15D51E6F-5B60-4FC6-BA9B-6FB531DBD218}" type="slidenum">
               <a:rPr lang="de-CH" smtClean="0"/>
-              <a:t>‹Nr.›</a:t>
+              <a:t>‹#›</a:t>
             </a:fld>
             <a:endParaRPr lang="de-CH"/>
           </a:p>
@@ -875,7 +876,7 @@
           <a:p>
             <a:fld id="{FC02D947-5CD4-43C9-B9B7-5313FA6B4BFC}" type="datetimeFigureOut">
               <a:rPr lang="de-CH" smtClean="0"/>
-              <a:t>25.12.2018</a:t>
+              <a:t>25.12.18</a:t>
             </a:fld>
             <a:endParaRPr lang="de-CH"/>
           </a:p>
@@ -929,7 +930,7 @@
           <a:p>
             <a:fld id="{15D51E6F-5B60-4FC6-BA9B-6FB531DBD218}" type="slidenum">
               <a:rPr lang="de-CH" smtClean="0"/>
-              <a:t>‹Nr.›</a:t>
+              <a:t>‹#›</a:t>
             </a:fld>
             <a:endParaRPr lang="de-CH"/>
           </a:p>
@@ -1151,7 +1152,7 @@
           <a:p>
             <a:fld id="{FC02D947-5CD4-43C9-B9B7-5313FA6B4BFC}" type="datetimeFigureOut">
               <a:rPr lang="de-CH" smtClean="0"/>
-              <a:t>25.12.2018</a:t>
+              <a:t>25.12.18</a:t>
             </a:fld>
             <a:endParaRPr lang="de-CH"/>
           </a:p>
@@ -1205,7 +1206,7 @@
           <a:p>
             <a:fld id="{15D51E6F-5B60-4FC6-BA9B-6FB531DBD218}" type="slidenum">
               <a:rPr lang="de-CH" smtClean="0"/>
-              <a:t>‹Nr.›</a:t>
+              <a:t>‹#›</a:t>
             </a:fld>
             <a:endParaRPr lang="de-CH"/>
           </a:p>
@@ -1419,7 +1420,7 @@
           <a:p>
             <a:fld id="{FC02D947-5CD4-43C9-B9B7-5313FA6B4BFC}" type="datetimeFigureOut">
               <a:rPr lang="de-CH" smtClean="0"/>
-              <a:t>25.12.2018</a:t>
+              <a:t>25.12.18</a:t>
             </a:fld>
             <a:endParaRPr lang="de-CH"/>
           </a:p>
@@ -1473,7 +1474,7 @@
           <a:p>
             <a:fld id="{15D51E6F-5B60-4FC6-BA9B-6FB531DBD218}" type="slidenum">
               <a:rPr lang="de-CH" smtClean="0"/>
-              <a:t>‹Nr.›</a:t>
+              <a:t>‹#›</a:t>
             </a:fld>
             <a:endParaRPr lang="de-CH"/>
           </a:p>
@@ -1834,7 +1835,7 @@
           <a:p>
             <a:fld id="{FC02D947-5CD4-43C9-B9B7-5313FA6B4BFC}" type="datetimeFigureOut">
               <a:rPr lang="de-CH" smtClean="0"/>
-              <a:t>25.12.2018</a:t>
+              <a:t>25.12.18</a:t>
             </a:fld>
             <a:endParaRPr lang="de-CH"/>
           </a:p>
@@ -1888,7 +1889,7 @@
           <a:p>
             <a:fld id="{15D51E6F-5B60-4FC6-BA9B-6FB531DBD218}" type="slidenum">
               <a:rPr lang="de-CH" smtClean="0"/>
-              <a:t>‹Nr.›</a:t>
+              <a:t>‹#›</a:t>
             </a:fld>
             <a:endParaRPr lang="de-CH"/>
           </a:p>
@@ -1976,7 +1977,7 @@
           <a:p>
             <a:fld id="{FC02D947-5CD4-43C9-B9B7-5313FA6B4BFC}" type="datetimeFigureOut">
               <a:rPr lang="de-CH" smtClean="0"/>
-              <a:t>25.12.2018</a:t>
+              <a:t>25.12.18</a:t>
             </a:fld>
             <a:endParaRPr lang="de-CH"/>
           </a:p>
@@ -2030,7 +2031,7 @@
           <a:p>
             <a:fld id="{15D51E6F-5B60-4FC6-BA9B-6FB531DBD218}" type="slidenum">
               <a:rPr lang="de-CH" smtClean="0"/>
-              <a:t>‹Nr.›</a:t>
+              <a:t>‹#›</a:t>
             </a:fld>
             <a:endParaRPr lang="de-CH"/>
           </a:p>
@@ -2089,7 +2090,7 @@
           <a:p>
             <a:fld id="{FC02D947-5CD4-43C9-B9B7-5313FA6B4BFC}" type="datetimeFigureOut">
               <a:rPr lang="de-CH" smtClean="0"/>
-              <a:t>25.12.2018</a:t>
+              <a:t>25.12.18</a:t>
             </a:fld>
             <a:endParaRPr lang="de-CH"/>
           </a:p>
@@ -2143,7 +2144,7 @@
           <a:p>
             <a:fld id="{15D51E6F-5B60-4FC6-BA9B-6FB531DBD218}" type="slidenum">
               <a:rPr lang="de-CH" smtClean="0"/>
-              <a:t>‹Nr.›</a:t>
+              <a:t>‹#›</a:t>
             </a:fld>
             <a:endParaRPr lang="de-CH"/>
           </a:p>
@@ -2402,7 +2403,7 @@
           <a:p>
             <a:fld id="{FC02D947-5CD4-43C9-B9B7-5313FA6B4BFC}" type="datetimeFigureOut">
               <a:rPr lang="de-CH" smtClean="0"/>
-              <a:t>25.12.2018</a:t>
+              <a:t>25.12.18</a:t>
             </a:fld>
             <a:endParaRPr lang="de-CH"/>
           </a:p>
@@ -2456,7 +2457,7 @@
           <a:p>
             <a:fld id="{15D51E6F-5B60-4FC6-BA9B-6FB531DBD218}" type="slidenum">
               <a:rPr lang="de-CH" smtClean="0"/>
-              <a:t>‹Nr.›</a:t>
+              <a:t>‹#›</a:t>
             </a:fld>
             <a:endParaRPr lang="de-CH"/>
           </a:p>
@@ -2691,7 +2692,7 @@
           <a:p>
             <a:fld id="{FC02D947-5CD4-43C9-B9B7-5313FA6B4BFC}" type="datetimeFigureOut">
               <a:rPr lang="de-CH" smtClean="0"/>
-              <a:t>25.12.2018</a:t>
+              <a:t>25.12.18</a:t>
             </a:fld>
             <a:endParaRPr lang="de-CH"/>
           </a:p>
@@ -2745,7 +2746,7 @@
           <a:p>
             <a:fld id="{15D51E6F-5B60-4FC6-BA9B-6FB531DBD218}" type="slidenum">
               <a:rPr lang="de-CH" smtClean="0"/>
-              <a:t>‹Nr.›</a:t>
+              <a:t>‹#›</a:t>
             </a:fld>
             <a:endParaRPr lang="de-CH"/>
           </a:p>
@@ -2934,7 +2935,7 @@
           <a:p>
             <a:fld id="{FC02D947-5CD4-43C9-B9B7-5313FA6B4BFC}" type="datetimeFigureOut">
               <a:rPr lang="de-CH" smtClean="0"/>
-              <a:t>25.12.2018</a:t>
+              <a:t>25.12.18</a:t>
             </a:fld>
             <a:endParaRPr lang="de-CH"/>
           </a:p>
@@ -3024,7 +3025,7 @@
           <a:p>
             <a:fld id="{15D51E6F-5B60-4FC6-BA9B-6FB531DBD218}" type="slidenum">
               <a:rPr lang="de-CH" smtClean="0"/>
-              <a:t>‹Nr.›</a:t>
+              <a:t>‹#›</a:t>
             </a:fld>
             <a:endParaRPr lang="de-CH"/>
           </a:p>
@@ -4663,6 +4664,134 @@
           <a:p>
             <a:r>
               <a:rPr lang="de-CH" dirty="0"/>
+              <a:t>Dataset – Daten 3</a:t>
+            </a:r>
+          </a:p>
+        </p:txBody>
+      </p:sp>
+      <p:sp>
+        <p:nvSpPr>
+          <p:cNvPr id="3" name="Inhaltsplatzhalter 2">
+            <a:extLst>
+              <a:ext uri="{FF2B5EF4-FFF2-40B4-BE49-F238E27FC236}">
+                <a16:creationId xmlns:a16="http://schemas.microsoft.com/office/drawing/2014/main" id="{204E2B80-1A15-4623-8C9C-DC9024E7A4ED}"/>
+              </a:ext>
+            </a:extLst>
+          </p:cNvPr>
+          <p:cNvSpPr>
+            <a:spLocks noGrp="1"/>
+          </p:cNvSpPr>
+          <p:nvPr>
+            <p:ph idx="1"/>
+          </p:nvPr>
+        </p:nvSpPr>
+        <p:spPr/>
+        <p:txBody>
+          <a:bodyPr/>
+          <a:lstStyle/>
+          <a:p>
+            <a:r>
+              <a:rPr lang="de-CH" dirty="0"/>
+              <a:t> Top 8 Jahre mit den meisten Abstürzen:</a:t>
+            </a:r>
+          </a:p>
+          <a:p>
+            <a:endParaRPr lang="de-CH" dirty="0"/>
+          </a:p>
+          <a:p>
+            <a:endParaRPr lang="de-CH" dirty="0"/>
+          </a:p>
+        </p:txBody>
+      </p:sp>
+      <p:pic>
+        <p:nvPicPr>
+          <p:cNvPr id="8" name="Picture 7">
+            <a:extLst>
+              <a:ext uri="{FF2B5EF4-FFF2-40B4-BE49-F238E27FC236}">
+                <a16:creationId xmlns:a16="http://schemas.microsoft.com/office/drawing/2014/main" id="{AF5C1690-7788-C74F-82A7-280A04D3BCDE}"/>
+              </a:ext>
+            </a:extLst>
+          </p:cNvPr>
+          <p:cNvPicPr>
+            <a:picLocks noChangeAspect="1"/>
+          </p:cNvPicPr>
+          <p:nvPr/>
+        </p:nvPicPr>
+        <p:blipFill>
+          <a:blip r:embed="rId2">
+            <a:extLst>
+              <a:ext uri="{28A0092B-C50C-407E-A947-70E740481C1C}">
+                <a14:useLocalDpi xmlns:a14="http://schemas.microsoft.com/office/drawing/2010/main" val="0"/>
+              </a:ext>
+            </a:extLst>
+          </a:blip>
+          <a:stretch>
+            <a:fillRect/>
+          </a:stretch>
+        </p:blipFill>
+        <p:spPr>
+          <a:xfrm>
+            <a:off x="838200" y="2407444"/>
+            <a:ext cx="8140700" cy="3187700"/>
+          </a:xfrm>
+          <a:prstGeom prst="rect">
+            <a:avLst/>
+          </a:prstGeom>
+        </p:spPr>
+      </p:pic>
+    </p:spTree>
+    <p:extLst>
+      <p:ext uri="{BB962C8B-B14F-4D97-AF65-F5344CB8AC3E}">
+        <p14:creationId xmlns:p14="http://schemas.microsoft.com/office/powerpoint/2010/main" val="3980459535"/>
+      </p:ext>
+    </p:extLst>
+  </p:cSld>
+  <p:clrMapOvr>
+    <a:masterClrMapping/>
+  </p:clrMapOvr>
+</p:sld>
+</file>
+
+<file path=ppt/slides/slide6.xml><?xml version="1.0" encoding="utf-8"?>
+<p:sld xmlns:a="http://schemas.openxmlformats.org/drawingml/2006/main" xmlns:r="http://schemas.openxmlformats.org/officeDocument/2006/relationships" xmlns:p="http://schemas.openxmlformats.org/presentationml/2006/main">
+  <p:cSld>
+    <p:spTree>
+      <p:nvGrpSpPr>
+        <p:cNvPr id="1" name=""/>
+        <p:cNvGrpSpPr/>
+        <p:nvPr/>
+      </p:nvGrpSpPr>
+      <p:grpSpPr>
+        <a:xfrm>
+          <a:off x="0" y="0"/>
+          <a:ext cx="0" cy="0"/>
+          <a:chOff x="0" y="0"/>
+          <a:chExt cx="0" cy="0"/>
+        </a:xfrm>
+      </p:grpSpPr>
+      <p:sp>
+        <p:nvSpPr>
+          <p:cNvPr id="2" name="Titel 1">
+            <a:extLst>
+              <a:ext uri="{FF2B5EF4-FFF2-40B4-BE49-F238E27FC236}">
+                <a16:creationId xmlns:a16="http://schemas.microsoft.com/office/drawing/2014/main" id="{E9563C62-FCD4-4589-816C-E2F2CFDC30C3}"/>
+              </a:ext>
+            </a:extLst>
+          </p:cNvPr>
+          <p:cNvSpPr>
+            <a:spLocks noGrp="1"/>
+          </p:cNvSpPr>
+          <p:nvPr>
+            <p:ph type="title"/>
+          </p:nvPr>
+        </p:nvSpPr>
+        <p:spPr/>
+        <p:txBody>
+          <a:bodyPr/>
+          <a:lstStyle/>
+          <a:p>
+            <a:r>
+              <a:rPr lang="de-CH" dirty="0"/>
               <a:t>Dataset – Quellen</a:t>
             </a:r>
           </a:p>

</xml_diff>